<commit_message>
Added books of account image
</commit_message>
<xml_diff>
--- a/Simplify/Documentation/DocumentationImageSource.pptx
+++ b/Simplify/Documentation/DocumentationImageSource.pptx
@@ -6,6 +6,7 @@
   </p:sldMasterIdLst>
   <p:sldIdLst>
     <p:sldId id="256" r:id="rId2"/>
+    <p:sldId id="257" r:id="rId3"/>
   </p:sldIdLst>
   <p:sldSz cx="9144000" cy="6858000" type="screen4x3"/>
   <p:notesSz cx="6858000" cy="9144000"/>
@@ -288,6 +289,7 @@
           <a:p>
             <a:fld id="{8A223AB6-DA15-4331-88D6-EB2DC8FC2CDD}" type="datetimeFigureOut">
               <a:rPr lang="en-US" smtClean="0"/>
+              <a:pPr/>
               <a:t>10/8/2017</a:t>
             </a:fld>
             <a:endParaRPr lang="en-US"/>
@@ -330,6 +332,7 @@
           <a:p>
             <a:fld id="{1A659D99-3299-4E0D-ADF8-F7ED9A32426B}" type="slidenum">
               <a:rPr lang="en-US" smtClean="0"/>
+              <a:pPr/>
               <a:t>‹#›</a:t>
             </a:fld>
             <a:endParaRPr lang="en-US"/>
@@ -453,6 +456,7 @@
           <a:p>
             <a:fld id="{8A223AB6-DA15-4331-88D6-EB2DC8FC2CDD}" type="datetimeFigureOut">
               <a:rPr lang="en-US" smtClean="0"/>
+              <a:pPr/>
               <a:t>10/8/2017</a:t>
             </a:fld>
             <a:endParaRPr lang="en-US"/>
@@ -495,6 +499,7 @@
           <a:p>
             <a:fld id="{1A659D99-3299-4E0D-ADF8-F7ED9A32426B}" type="slidenum">
               <a:rPr lang="en-US" smtClean="0"/>
+              <a:pPr/>
               <a:t>‹#›</a:t>
             </a:fld>
             <a:endParaRPr lang="en-US"/>
@@ -628,6 +633,7 @@
           <a:p>
             <a:fld id="{8A223AB6-DA15-4331-88D6-EB2DC8FC2CDD}" type="datetimeFigureOut">
               <a:rPr lang="en-US" smtClean="0"/>
+              <a:pPr/>
               <a:t>10/8/2017</a:t>
             </a:fld>
             <a:endParaRPr lang="en-US"/>
@@ -670,6 +676,7 @@
           <a:p>
             <a:fld id="{1A659D99-3299-4E0D-ADF8-F7ED9A32426B}" type="slidenum">
               <a:rPr lang="en-US" smtClean="0"/>
+              <a:pPr/>
               <a:t>‹#›</a:t>
             </a:fld>
             <a:endParaRPr lang="en-US"/>
@@ -793,6 +800,7 @@
           <a:p>
             <a:fld id="{8A223AB6-DA15-4331-88D6-EB2DC8FC2CDD}" type="datetimeFigureOut">
               <a:rPr lang="en-US" smtClean="0"/>
+              <a:pPr/>
               <a:t>10/8/2017</a:t>
             </a:fld>
             <a:endParaRPr lang="en-US"/>
@@ -835,6 +843,7 @@
           <a:p>
             <a:fld id="{1A659D99-3299-4E0D-ADF8-F7ED9A32426B}" type="slidenum">
               <a:rPr lang="en-US" smtClean="0"/>
+              <a:pPr/>
               <a:t>‹#›</a:t>
             </a:fld>
             <a:endParaRPr lang="en-US"/>
@@ -1034,6 +1043,7 @@
           <a:p>
             <a:fld id="{8A223AB6-DA15-4331-88D6-EB2DC8FC2CDD}" type="datetimeFigureOut">
               <a:rPr lang="en-US" smtClean="0"/>
+              <a:pPr/>
               <a:t>10/8/2017</a:t>
             </a:fld>
             <a:endParaRPr lang="en-US"/>
@@ -1076,6 +1086,7 @@
           <a:p>
             <a:fld id="{1A659D99-3299-4E0D-ADF8-F7ED9A32426B}" type="slidenum">
               <a:rPr lang="en-US" smtClean="0"/>
+              <a:pPr/>
               <a:t>‹#›</a:t>
             </a:fld>
             <a:endParaRPr lang="en-US"/>
@@ -1317,6 +1328,7 @@
           <a:p>
             <a:fld id="{8A223AB6-DA15-4331-88D6-EB2DC8FC2CDD}" type="datetimeFigureOut">
               <a:rPr lang="en-US" smtClean="0"/>
+              <a:pPr/>
               <a:t>10/8/2017</a:t>
             </a:fld>
             <a:endParaRPr lang="en-US"/>
@@ -1359,6 +1371,7 @@
           <a:p>
             <a:fld id="{1A659D99-3299-4E0D-ADF8-F7ED9A32426B}" type="slidenum">
               <a:rPr lang="en-US" smtClean="0"/>
+              <a:pPr/>
               <a:t>‹#›</a:t>
             </a:fld>
             <a:endParaRPr lang="en-US"/>
@@ -1734,6 +1747,7 @@
           <a:p>
             <a:fld id="{8A223AB6-DA15-4331-88D6-EB2DC8FC2CDD}" type="datetimeFigureOut">
               <a:rPr lang="en-US" smtClean="0"/>
+              <a:pPr/>
               <a:t>10/8/2017</a:t>
             </a:fld>
             <a:endParaRPr lang="en-US"/>
@@ -1776,6 +1790,7 @@
           <a:p>
             <a:fld id="{1A659D99-3299-4E0D-ADF8-F7ED9A32426B}" type="slidenum">
               <a:rPr lang="en-US" smtClean="0"/>
+              <a:pPr/>
               <a:t>‹#›</a:t>
             </a:fld>
             <a:endParaRPr lang="en-US"/>
@@ -1847,6 +1862,7 @@
           <a:p>
             <a:fld id="{8A223AB6-DA15-4331-88D6-EB2DC8FC2CDD}" type="datetimeFigureOut">
               <a:rPr lang="en-US" smtClean="0"/>
+              <a:pPr/>
               <a:t>10/8/2017</a:t>
             </a:fld>
             <a:endParaRPr lang="en-US"/>
@@ -1889,6 +1905,7 @@
           <a:p>
             <a:fld id="{1A659D99-3299-4E0D-ADF8-F7ED9A32426B}" type="slidenum">
               <a:rPr lang="en-US" smtClean="0"/>
+              <a:pPr/>
               <a:t>‹#›</a:t>
             </a:fld>
             <a:endParaRPr lang="en-US"/>
@@ -1937,6 +1954,7 @@
           <a:p>
             <a:fld id="{8A223AB6-DA15-4331-88D6-EB2DC8FC2CDD}" type="datetimeFigureOut">
               <a:rPr lang="en-US" smtClean="0"/>
+              <a:pPr/>
               <a:t>10/8/2017</a:t>
             </a:fld>
             <a:endParaRPr lang="en-US"/>
@@ -1979,6 +1997,7 @@
           <a:p>
             <a:fld id="{1A659D99-3299-4E0D-ADF8-F7ED9A32426B}" type="slidenum">
               <a:rPr lang="en-US" smtClean="0"/>
+              <a:pPr/>
               <a:t>‹#›</a:t>
             </a:fld>
             <a:endParaRPr lang="en-US"/>
@@ -2209,6 +2228,7 @@
           <a:p>
             <a:fld id="{8A223AB6-DA15-4331-88D6-EB2DC8FC2CDD}" type="datetimeFigureOut">
               <a:rPr lang="en-US" smtClean="0"/>
+              <a:pPr/>
               <a:t>10/8/2017</a:t>
             </a:fld>
             <a:endParaRPr lang="en-US"/>
@@ -2251,6 +2271,7 @@
           <a:p>
             <a:fld id="{1A659D99-3299-4E0D-ADF8-F7ED9A32426B}" type="slidenum">
               <a:rPr lang="en-US" smtClean="0"/>
+              <a:pPr/>
               <a:t>‹#›</a:t>
             </a:fld>
             <a:endParaRPr lang="en-US"/>
@@ -2457,6 +2478,7 @@
           <a:p>
             <a:fld id="{8A223AB6-DA15-4331-88D6-EB2DC8FC2CDD}" type="datetimeFigureOut">
               <a:rPr lang="en-US" smtClean="0"/>
+              <a:pPr/>
               <a:t>10/8/2017</a:t>
             </a:fld>
             <a:endParaRPr lang="en-US"/>
@@ -2499,6 +2521,7 @@
           <a:p>
             <a:fld id="{1A659D99-3299-4E0D-ADF8-F7ED9A32426B}" type="slidenum">
               <a:rPr lang="en-US" smtClean="0"/>
+              <a:pPr/>
               <a:t>‹#›</a:t>
             </a:fld>
             <a:endParaRPr lang="en-US"/>
@@ -2665,6 +2688,7 @@
           <a:p>
             <a:fld id="{8A223AB6-DA15-4331-88D6-EB2DC8FC2CDD}" type="datetimeFigureOut">
               <a:rPr lang="en-US" smtClean="0"/>
+              <a:pPr/>
               <a:t>10/8/2017</a:t>
             </a:fld>
             <a:endParaRPr lang="en-US"/>
@@ -2743,6 +2767,7 @@
           <a:p>
             <a:fld id="{1A659D99-3299-4E0D-ADF8-F7ED9A32426B}" type="slidenum">
               <a:rPr lang="en-US" smtClean="0"/>
+              <a:pPr/>
               <a:t>‹#›</a:t>
             </a:fld>
             <a:endParaRPr lang="en-US"/>
@@ -3117,11 +3142,6 @@
               </a:rPr>
               <a:t>2</a:t>
             </a:r>
-            <a:endParaRPr lang="en-US" dirty="0">
-              <a:solidFill>
-                <a:schemeClr val="tx1"/>
-              </a:solidFill>
-            </a:endParaRPr>
           </a:p>
         </p:txBody>
       </p:sp>
@@ -3249,11 +3269,6 @@
               </a:rPr>
               <a:t>4</a:t>
             </a:r>
-            <a:endParaRPr lang="en-US" dirty="0">
-              <a:solidFill>
-                <a:schemeClr val="tx1"/>
-              </a:solidFill>
-            </a:endParaRPr>
           </a:p>
         </p:txBody>
       </p:sp>
@@ -3381,11 +3396,6 @@
               </a:rPr>
               <a:t>6</a:t>
             </a:r>
-            <a:endParaRPr lang="en-US" dirty="0">
-              <a:solidFill>
-                <a:schemeClr val="tx1"/>
-              </a:solidFill>
-            </a:endParaRPr>
           </a:p>
         </p:txBody>
       </p:sp>
@@ -3513,11 +3523,6 @@
               </a:rPr>
               <a:t>8</a:t>
             </a:r>
-            <a:endParaRPr lang="en-US" dirty="0">
-              <a:solidFill>
-                <a:schemeClr val="tx1"/>
-              </a:solidFill>
-            </a:endParaRPr>
           </a:p>
         </p:txBody>
       </p:sp>
@@ -3725,6 +3730,583 @@
       </p:par>
     </p:tnLst>
   </p:timing>
+</p:sld>
+</file>
+
+<file path=ppt/slides/slide2.xml><?xml version="1.0" encoding="utf-8"?>
+<p:sld xmlns:a="http://schemas.openxmlformats.org/drawingml/2006/main" xmlns:r="http://schemas.openxmlformats.org/officeDocument/2006/relationships" xmlns:p="http://schemas.openxmlformats.org/presentationml/2006/main">
+  <p:cSld>
+    <p:spTree>
+      <p:nvGrpSpPr>
+        <p:cNvPr id="1" name=""/>
+        <p:cNvGrpSpPr/>
+        <p:nvPr/>
+      </p:nvGrpSpPr>
+      <p:grpSpPr>
+        <a:xfrm>
+          <a:off x="0" y="0"/>
+          <a:ext cx="0" cy="0"/>
+          <a:chOff x="0" y="0"/>
+          <a:chExt cx="0" cy="0"/>
+        </a:xfrm>
+      </p:grpSpPr>
+      <p:pic>
+        <p:nvPicPr>
+          <p:cNvPr id="4" name="Picture 3" descr="SimplifyUi_2017-10-08_18-59-59.png"/>
+          <p:cNvPicPr>
+            <a:picLocks noChangeAspect="1"/>
+          </p:cNvPicPr>
+          <p:nvPr/>
+        </p:nvPicPr>
+        <p:blipFill>
+          <a:blip r:embed="rId2" cstate="print"/>
+          <a:stretch>
+            <a:fillRect/>
+          </a:stretch>
+        </p:blipFill>
+        <p:spPr>
+          <a:xfrm>
+            <a:off x="1722273" y="1291805"/>
+            <a:ext cx="5715496" cy="4290432"/>
+          </a:xfrm>
+          <a:prstGeom prst="rect">
+            <a:avLst/>
+          </a:prstGeom>
+        </p:spPr>
+      </p:pic>
+      <p:sp>
+        <p:nvSpPr>
+          <p:cNvPr id="5" name="Oval Callout 4"/>
+          <p:cNvSpPr/>
+          <p:nvPr/>
+        </p:nvSpPr>
+        <p:spPr>
+          <a:xfrm>
+            <a:off x="914400" y="1219200"/>
+            <a:ext cx="685800" cy="381000"/>
+          </a:xfrm>
+          <a:prstGeom prst="wedgeEllipseCallout">
+            <a:avLst>
+              <a:gd name="adj1" fmla="val 89110"/>
+              <a:gd name="adj2" fmla="val 65139"/>
+            </a:avLst>
+          </a:prstGeom>
+          <a:solidFill>
+            <a:srgbClr val="92D050"/>
+          </a:solidFill>
+          <a:ln>
+            <a:solidFill>
+              <a:schemeClr val="accent3">
+                <a:lumMod val="60000"/>
+                <a:lumOff val="40000"/>
+              </a:schemeClr>
+            </a:solidFill>
+          </a:ln>
+        </p:spPr>
+        <p:style>
+          <a:lnRef idx="2">
+            <a:schemeClr val="accent1">
+              <a:shade val="50000"/>
+            </a:schemeClr>
+          </a:lnRef>
+          <a:fillRef idx="1">
+            <a:schemeClr val="accent1"/>
+          </a:fillRef>
+          <a:effectRef idx="0">
+            <a:schemeClr val="accent1"/>
+          </a:effectRef>
+          <a:fontRef idx="minor">
+            <a:schemeClr val="lt1"/>
+          </a:fontRef>
+        </p:style>
+        <p:txBody>
+          <a:bodyPr rtlCol="0" anchor="ctr"/>
+          <a:lstStyle/>
+          <a:p>
+            <a:pPr algn="ctr"/>
+            <a:r>
+              <a:rPr lang="en-US" dirty="0" smtClean="0">
+                <a:solidFill>
+                  <a:schemeClr val="tx1"/>
+                </a:solidFill>
+              </a:rPr>
+              <a:t>2</a:t>
+            </a:r>
+            <a:endParaRPr lang="en-US" dirty="0">
+              <a:solidFill>
+                <a:schemeClr val="tx1"/>
+              </a:solidFill>
+            </a:endParaRPr>
+          </a:p>
+        </p:txBody>
+      </p:sp>
+      <p:sp>
+        <p:nvSpPr>
+          <p:cNvPr id="6" name="Oval Callout 5"/>
+          <p:cNvSpPr/>
+          <p:nvPr/>
+        </p:nvSpPr>
+        <p:spPr>
+          <a:xfrm>
+            <a:off x="7467600" y="1828800"/>
+            <a:ext cx="685800" cy="381000"/>
+          </a:xfrm>
+          <a:prstGeom prst="wedgeEllipseCallout">
+            <a:avLst>
+              <a:gd name="adj1" fmla="val -101534"/>
+              <a:gd name="adj2" fmla="val 73560"/>
+            </a:avLst>
+          </a:prstGeom>
+          <a:solidFill>
+            <a:srgbClr val="92D050"/>
+          </a:solidFill>
+          <a:ln>
+            <a:solidFill>
+              <a:schemeClr val="accent3">
+                <a:lumMod val="60000"/>
+                <a:lumOff val="40000"/>
+              </a:schemeClr>
+            </a:solidFill>
+          </a:ln>
+        </p:spPr>
+        <p:style>
+          <a:lnRef idx="2">
+            <a:schemeClr val="accent1">
+              <a:shade val="50000"/>
+            </a:schemeClr>
+          </a:lnRef>
+          <a:fillRef idx="1">
+            <a:schemeClr val="accent1"/>
+          </a:fillRef>
+          <a:effectRef idx="0">
+            <a:schemeClr val="accent1"/>
+          </a:effectRef>
+          <a:fontRef idx="minor">
+            <a:schemeClr val="lt1"/>
+          </a:fontRef>
+        </p:style>
+        <p:txBody>
+          <a:bodyPr rtlCol="0" anchor="ctr"/>
+          <a:lstStyle/>
+          <a:p>
+            <a:pPr algn="ctr"/>
+            <a:r>
+              <a:rPr lang="en-US" dirty="0" smtClean="0">
+                <a:solidFill>
+                  <a:schemeClr val="tx1"/>
+                </a:solidFill>
+              </a:rPr>
+              <a:t>3</a:t>
+            </a:r>
+            <a:endParaRPr lang="en-US" dirty="0">
+              <a:solidFill>
+                <a:schemeClr val="tx1"/>
+              </a:solidFill>
+            </a:endParaRPr>
+          </a:p>
+        </p:txBody>
+      </p:sp>
+      <p:sp>
+        <p:nvSpPr>
+          <p:cNvPr id="7" name="Oval Callout 6"/>
+          <p:cNvSpPr/>
+          <p:nvPr/>
+        </p:nvSpPr>
+        <p:spPr>
+          <a:xfrm>
+            <a:off x="914400" y="3276600"/>
+            <a:ext cx="685800" cy="381000"/>
+          </a:xfrm>
+          <a:prstGeom prst="wedgeEllipseCallout">
+            <a:avLst>
+              <a:gd name="adj1" fmla="val 290280"/>
+              <a:gd name="adj2" fmla="val -212756"/>
+            </a:avLst>
+          </a:prstGeom>
+          <a:solidFill>
+            <a:srgbClr val="92D050"/>
+          </a:solidFill>
+          <a:ln>
+            <a:solidFill>
+              <a:schemeClr val="accent3">
+                <a:lumMod val="60000"/>
+                <a:lumOff val="40000"/>
+              </a:schemeClr>
+            </a:solidFill>
+          </a:ln>
+        </p:spPr>
+        <p:style>
+          <a:lnRef idx="2">
+            <a:schemeClr val="accent1">
+              <a:shade val="50000"/>
+            </a:schemeClr>
+          </a:lnRef>
+          <a:fillRef idx="1">
+            <a:schemeClr val="accent1"/>
+          </a:fillRef>
+          <a:effectRef idx="0">
+            <a:schemeClr val="accent1"/>
+          </a:effectRef>
+          <a:fontRef idx="minor">
+            <a:schemeClr val="lt1"/>
+          </a:fontRef>
+        </p:style>
+        <p:txBody>
+          <a:bodyPr rtlCol="0" anchor="ctr"/>
+          <a:lstStyle/>
+          <a:p>
+            <a:pPr algn="ctr"/>
+            <a:r>
+              <a:rPr lang="en-US" dirty="0" smtClean="0">
+                <a:solidFill>
+                  <a:schemeClr val="tx1"/>
+                </a:solidFill>
+              </a:rPr>
+              <a:t>4</a:t>
+            </a:r>
+            <a:endParaRPr lang="en-US" dirty="0">
+              <a:solidFill>
+                <a:schemeClr val="tx1"/>
+              </a:solidFill>
+            </a:endParaRPr>
+          </a:p>
+        </p:txBody>
+      </p:sp>
+      <p:sp>
+        <p:nvSpPr>
+          <p:cNvPr id="8" name="Oval Callout 7"/>
+          <p:cNvSpPr/>
+          <p:nvPr/>
+        </p:nvSpPr>
+        <p:spPr>
+          <a:xfrm>
+            <a:off x="7543800" y="3581400"/>
+            <a:ext cx="685800" cy="381000"/>
+          </a:xfrm>
+          <a:prstGeom prst="wedgeEllipseCallout">
+            <a:avLst>
+              <a:gd name="adj1" fmla="val -112059"/>
+              <a:gd name="adj2" fmla="val -122229"/>
+            </a:avLst>
+          </a:prstGeom>
+          <a:solidFill>
+            <a:srgbClr val="92D050"/>
+          </a:solidFill>
+          <a:ln>
+            <a:solidFill>
+              <a:schemeClr val="accent3">
+                <a:lumMod val="60000"/>
+                <a:lumOff val="40000"/>
+              </a:schemeClr>
+            </a:solidFill>
+          </a:ln>
+        </p:spPr>
+        <p:style>
+          <a:lnRef idx="2">
+            <a:schemeClr val="accent1">
+              <a:shade val="50000"/>
+            </a:schemeClr>
+          </a:lnRef>
+          <a:fillRef idx="1">
+            <a:schemeClr val="accent1"/>
+          </a:fillRef>
+          <a:effectRef idx="0">
+            <a:schemeClr val="accent1"/>
+          </a:effectRef>
+          <a:fontRef idx="minor">
+            <a:schemeClr val="lt1"/>
+          </a:fontRef>
+        </p:style>
+        <p:txBody>
+          <a:bodyPr rtlCol="0" anchor="ctr"/>
+          <a:lstStyle/>
+          <a:p>
+            <a:pPr algn="ctr"/>
+            <a:r>
+              <a:rPr lang="en-US" dirty="0" smtClean="0">
+                <a:solidFill>
+                  <a:schemeClr val="tx1"/>
+                </a:solidFill>
+              </a:rPr>
+              <a:t>5</a:t>
+            </a:r>
+            <a:endParaRPr lang="en-US" dirty="0">
+              <a:solidFill>
+                <a:schemeClr val="tx1"/>
+              </a:solidFill>
+            </a:endParaRPr>
+          </a:p>
+        </p:txBody>
+      </p:sp>
+      <p:sp>
+        <p:nvSpPr>
+          <p:cNvPr id="9" name="Oval Callout 8"/>
+          <p:cNvSpPr/>
+          <p:nvPr/>
+        </p:nvSpPr>
+        <p:spPr>
+          <a:xfrm>
+            <a:off x="914400" y="4191000"/>
+            <a:ext cx="685800" cy="381000"/>
+          </a:xfrm>
+          <a:prstGeom prst="wedgeEllipseCallout">
+            <a:avLst>
+              <a:gd name="adj1" fmla="val 290280"/>
+              <a:gd name="adj2" fmla="val -212756"/>
+            </a:avLst>
+          </a:prstGeom>
+          <a:solidFill>
+            <a:srgbClr val="92D050"/>
+          </a:solidFill>
+          <a:ln>
+            <a:solidFill>
+              <a:schemeClr val="accent3">
+                <a:lumMod val="60000"/>
+                <a:lumOff val="40000"/>
+              </a:schemeClr>
+            </a:solidFill>
+          </a:ln>
+        </p:spPr>
+        <p:style>
+          <a:lnRef idx="2">
+            <a:schemeClr val="accent1">
+              <a:shade val="50000"/>
+            </a:schemeClr>
+          </a:lnRef>
+          <a:fillRef idx="1">
+            <a:schemeClr val="accent1"/>
+          </a:fillRef>
+          <a:effectRef idx="0">
+            <a:schemeClr val="accent1"/>
+          </a:effectRef>
+          <a:fontRef idx="minor">
+            <a:schemeClr val="lt1"/>
+          </a:fontRef>
+        </p:style>
+        <p:txBody>
+          <a:bodyPr rtlCol="0" anchor="ctr"/>
+          <a:lstStyle/>
+          <a:p>
+            <a:pPr algn="ctr"/>
+            <a:r>
+              <a:rPr lang="en-US" dirty="0" smtClean="0">
+                <a:solidFill>
+                  <a:schemeClr val="tx1"/>
+                </a:solidFill>
+              </a:rPr>
+              <a:t>6</a:t>
+            </a:r>
+            <a:endParaRPr lang="en-US" dirty="0">
+              <a:solidFill>
+                <a:schemeClr val="tx1"/>
+              </a:solidFill>
+            </a:endParaRPr>
+          </a:p>
+        </p:txBody>
+      </p:sp>
+      <p:sp>
+        <p:nvSpPr>
+          <p:cNvPr id="10" name="Oval Callout 9"/>
+          <p:cNvSpPr/>
+          <p:nvPr/>
+        </p:nvSpPr>
+        <p:spPr>
+          <a:xfrm>
+            <a:off x="5486400" y="4495800"/>
+            <a:ext cx="685800" cy="381000"/>
+          </a:xfrm>
+          <a:prstGeom prst="wedgeEllipseCallout">
+            <a:avLst>
+              <a:gd name="adj1" fmla="val -148317"/>
+              <a:gd name="adj2" fmla="val -118019"/>
+            </a:avLst>
+          </a:prstGeom>
+          <a:solidFill>
+            <a:srgbClr val="92D050"/>
+          </a:solidFill>
+          <a:ln>
+            <a:solidFill>
+              <a:schemeClr val="accent3">
+                <a:lumMod val="60000"/>
+                <a:lumOff val="40000"/>
+              </a:schemeClr>
+            </a:solidFill>
+          </a:ln>
+        </p:spPr>
+        <p:style>
+          <a:lnRef idx="2">
+            <a:schemeClr val="accent1">
+              <a:shade val="50000"/>
+            </a:schemeClr>
+          </a:lnRef>
+          <a:fillRef idx="1">
+            <a:schemeClr val="accent1"/>
+          </a:fillRef>
+          <a:effectRef idx="0">
+            <a:schemeClr val="accent1"/>
+          </a:effectRef>
+          <a:fontRef idx="minor">
+            <a:schemeClr val="lt1"/>
+          </a:fontRef>
+        </p:style>
+        <p:txBody>
+          <a:bodyPr rtlCol="0" anchor="ctr"/>
+          <a:lstStyle/>
+          <a:p>
+            <a:pPr algn="ctr"/>
+            <a:r>
+              <a:rPr lang="en-US" dirty="0" smtClean="0">
+                <a:solidFill>
+                  <a:schemeClr val="tx1"/>
+                </a:solidFill>
+              </a:rPr>
+              <a:t>8</a:t>
+            </a:r>
+            <a:endParaRPr lang="en-US" dirty="0">
+              <a:solidFill>
+                <a:schemeClr val="tx1"/>
+              </a:solidFill>
+            </a:endParaRPr>
+          </a:p>
+        </p:txBody>
+      </p:sp>
+      <p:sp>
+        <p:nvSpPr>
+          <p:cNvPr id="11" name="Oval Callout 10"/>
+          <p:cNvSpPr/>
+          <p:nvPr/>
+        </p:nvSpPr>
+        <p:spPr>
+          <a:xfrm>
+            <a:off x="5486400" y="3429000"/>
+            <a:ext cx="685800" cy="381000"/>
+          </a:xfrm>
+          <a:prstGeom prst="wedgeEllipseCallout">
+            <a:avLst>
+              <a:gd name="adj1" fmla="val -150655"/>
+              <a:gd name="adj2" fmla="val 73561"/>
+            </a:avLst>
+          </a:prstGeom>
+          <a:solidFill>
+            <a:srgbClr val="92D050"/>
+          </a:solidFill>
+          <a:ln>
+            <a:solidFill>
+              <a:schemeClr val="accent3">
+                <a:lumMod val="60000"/>
+                <a:lumOff val="40000"/>
+              </a:schemeClr>
+            </a:solidFill>
+          </a:ln>
+        </p:spPr>
+        <p:style>
+          <a:lnRef idx="2">
+            <a:schemeClr val="accent1">
+              <a:shade val="50000"/>
+            </a:schemeClr>
+          </a:lnRef>
+          <a:fillRef idx="1">
+            <a:schemeClr val="accent1"/>
+          </a:fillRef>
+          <a:effectRef idx="0">
+            <a:schemeClr val="accent1"/>
+          </a:effectRef>
+          <a:fontRef idx="minor">
+            <a:schemeClr val="lt1"/>
+          </a:fontRef>
+        </p:style>
+        <p:txBody>
+          <a:bodyPr rtlCol="0" anchor="ctr"/>
+          <a:lstStyle/>
+          <a:p>
+            <a:pPr algn="ctr"/>
+            <a:r>
+              <a:rPr lang="en-US" dirty="0" smtClean="0">
+                <a:solidFill>
+                  <a:schemeClr val="tx1"/>
+                </a:solidFill>
+              </a:rPr>
+              <a:t>7</a:t>
+            </a:r>
+            <a:endParaRPr lang="en-US" dirty="0">
+              <a:solidFill>
+                <a:schemeClr val="tx1"/>
+              </a:solidFill>
+            </a:endParaRPr>
+          </a:p>
+        </p:txBody>
+      </p:sp>
+      <p:sp>
+        <p:nvSpPr>
+          <p:cNvPr id="12" name="Oval Callout 11"/>
+          <p:cNvSpPr/>
+          <p:nvPr/>
+        </p:nvSpPr>
+        <p:spPr>
+          <a:xfrm>
+            <a:off x="7620000" y="4800600"/>
+            <a:ext cx="685800" cy="381000"/>
+          </a:xfrm>
+          <a:prstGeom prst="wedgeEllipseCallout">
+            <a:avLst>
+              <a:gd name="adj1" fmla="val -117908"/>
+              <a:gd name="adj2" fmla="val 79876"/>
+            </a:avLst>
+          </a:prstGeom>
+          <a:solidFill>
+            <a:srgbClr val="92D050"/>
+          </a:solidFill>
+          <a:ln>
+            <a:solidFill>
+              <a:schemeClr val="accent3">
+                <a:lumMod val="60000"/>
+                <a:lumOff val="40000"/>
+              </a:schemeClr>
+            </a:solidFill>
+          </a:ln>
+        </p:spPr>
+        <p:style>
+          <a:lnRef idx="2">
+            <a:schemeClr val="accent1">
+              <a:shade val="50000"/>
+            </a:schemeClr>
+          </a:lnRef>
+          <a:fillRef idx="1">
+            <a:schemeClr val="accent1"/>
+          </a:fillRef>
+          <a:effectRef idx="0">
+            <a:schemeClr val="accent1"/>
+          </a:effectRef>
+          <a:fontRef idx="minor">
+            <a:schemeClr val="lt1"/>
+          </a:fontRef>
+        </p:style>
+        <p:txBody>
+          <a:bodyPr rtlCol="0" anchor="ctr"/>
+          <a:lstStyle/>
+          <a:p>
+            <a:pPr algn="ctr"/>
+            <a:r>
+              <a:rPr lang="en-US" dirty="0" smtClean="0">
+                <a:solidFill>
+                  <a:schemeClr val="tx1"/>
+                </a:solidFill>
+              </a:rPr>
+              <a:t>9</a:t>
+            </a:r>
+            <a:endParaRPr lang="en-US" dirty="0">
+              <a:solidFill>
+                <a:schemeClr val="tx1"/>
+              </a:solidFill>
+            </a:endParaRPr>
+          </a:p>
+        </p:txBody>
+      </p:sp>
+    </p:spTree>
+  </p:cSld>
+  <p:clrMapOvr>
+    <a:masterClrMapping/>
+  </p:clrMapOvr>
 </p:sld>
 </file>
 

</xml_diff>